<commit_message>
NFT, Blockchain PPTs updated
</commit_message>
<xml_diff>
--- a/PPT.pptx
+++ b/PPT.pptx
@@ -119,7 +119,7 @@
   </p:defaultTextStyle>
   <p:extLst>
     <p:ext uri="{EFAFB233-063F-42B5-8137-9DF3F51BA10A}">
-      <p15:sldGuideLst xmlns="" xmlns:p15="http://schemas.microsoft.com/office/powerpoint/2012/main">
+      <p15:sldGuideLst xmlns:p15="http://schemas.microsoft.com/office/powerpoint/2012/main" xmlns="">
         <p15:guide id="1" orient="horz" pos="2160">
           <p15:clr>
             <a:srgbClr val="A4A3A4"/>
@@ -356,7 +356,7 @@
           <p:cNvPr id="8" name="Date Placeholder 7">
             <a:extLst>
               <a:ext uri="{FF2B5EF4-FFF2-40B4-BE49-F238E27FC236}">
-                <a16:creationId xmlns="" xmlns:a16="http://schemas.microsoft.com/office/drawing/2014/main" id="{7FA0ACE7-29A8-47D3-A7D9-257B711D8023}"/>
+                <a16:creationId xmlns:a16="http://schemas.microsoft.com/office/drawing/2014/main" xmlns="" id="{7FA0ACE7-29A8-47D3-A7D9-257B711D8023}"/>
               </a:ext>
             </a:extLst>
           </p:cNvPr>
@@ -375,7 +375,7 @@
             <a:fld id="{ED291B17-9318-49DB-B28B-6E5994AE9581}" type="datetime1">
               <a:rPr lang="en-US" smtClean="0"/>
               <a:pPr/>
-              <a:t>4/23/2021</a:t>
+              <a:t>4/29/2021</a:t>
             </a:fld>
             <a:endParaRPr lang="en-US" dirty="0"/>
           </a:p>
@@ -386,7 +386,7 @@
           <p:cNvPr id="9" name="Footer Placeholder 8">
             <a:extLst>
               <a:ext uri="{FF2B5EF4-FFF2-40B4-BE49-F238E27FC236}">
-                <a16:creationId xmlns="" xmlns:a16="http://schemas.microsoft.com/office/drawing/2014/main" id="{DEC604B9-52E9-4810-8359-47206518D038}"/>
+                <a16:creationId xmlns:a16="http://schemas.microsoft.com/office/drawing/2014/main" xmlns="" id="{DEC604B9-52E9-4810-8359-47206518D038}"/>
               </a:ext>
             </a:extLst>
           </p:cNvPr>
@@ -411,7 +411,7 @@
           <p:cNvPr id="10" name="Slide Number Placeholder 9">
             <a:extLst>
               <a:ext uri="{FF2B5EF4-FFF2-40B4-BE49-F238E27FC236}">
-                <a16:creationId xmlns="" xmlns:a16="http://schemas.microsoft.com/office/drawing/2014/main" id="{5898A89F-CA25-400F-B05A-AECBF2517E4F}"/>
+                <a16:creationId xmlns:a16="http://schemas.microsoft.com/office/drawing/2014/main" xmlns="" id="{5898A89F-CA25-400F-B05A-AECBF2517E4F}"/>
               </a:ext>
             </a:extLst>
           </p:cNvPr>
@@ -439,7 +439,7 @@
     </p:spTree>
     <p:extLst>
       <p:ext uri="{BB962C8B-B14F-4D97-AF65-F5344CB8AC3E}">
-        <p14:creationId xmlns="" xmlns:p14="http://schemas.microsoft.com/office/powerpoint/2010/main" val="490017585"/>
+        <p14:creationId xmlns:p14="http://schemas.microsoft.com/office/powerpoint/2010/main" xmlns="" val="490017585"/>
       </p:ext>
     </p:extLst>
   </p:cSld>
@@ -580,7 +580,7 @@
             <a:fld id="{2CED4963-E985-44C4-B8C4-FDD613B7C2F8}" type="datetime1">
               <a:rPr lang="en-US" smtClean="0"/>
               <a:pPr/>
-              <a:t>4/23/2021</a:t>
+              <a:t>4/29/2021</a:t>
             </a:fld>
             <a:endParaRPr lang="en-US" dirty="0"/>
           </a:p>
@@ -632,7 +632,7 @@
     </p:spTree>
     <p:extLst>
       <p:ext uri="{BB962C8B-B14F-4D97-AF65-F5344CB8AC3E}">
-        <p14:creationId xmlns="" xmlns:p14="http://schemas.microsoft.com/office/powerpoint/2010/main" val="1283591147"/>
+        <p14:creationId xmlns:p14="http://schemas.microsoft.com/office/powerpoint/2010/main" xmlns="" val="1283591147"/>
       </p:ext>
     </p:extLst>
   </p:cSld>
@@ -796,7 +796,7 @@
           <p:cNvPr id="8" name="Rectangle 7">
             <a:extLst>
               <a:ext uri="{FF2B5EF4-FFF2-40B4-BE49-F238E27FC236}">
-                <a16:creationId xmlns="" xmlns:a16="http://schemas.microsoft.com/office/drawing/2014/main" id="{F6423B97-A5D4-47B9-8861-73B3707A04CF}"/>
+                <a16:creationId xmlns:a16="http://schemas.microsoft.com/office/drawing/2014/main" xmlns="" id="{F6423B97-A5D4-47B9-8861-73B3707A04CF}"/>
               </a:ext>
             </a:extLst>
           </p:cNvPr>
@@ -839,7 +839,7 @@
           <p:cNvPr id="9" name="Rectangle 8">
             <a:extLst>
               <a:ext uri="{FF2B5EF4-FFF2-40B4-BE49-F238E27FC236}">
-                <a16:creationId xmlns="" xmlns:a16="http://schemas.microsoft.com/office/drawing/2014/main" id="{1AEC0421-37B4-4481-A10D-69FDF5EC7909}"/>
+                <a16:creationId xmlns:a16="http://schemas.microsoft.com/office/drawing/2014/main" xmlns="" id="{1AEC0421-37B4-4481-A10D-69FDF5EC7909}"/>
               </a:ext>
             </a:extLst>
           </p:cNvPr>
@@ -882,7 +882,7 @@
           <p:cNvPr id="10" name="Rectangle 9">
             <a:extLst>
               <a:ext uri="{FF2B5EF4-FFF2-40B4-BE49-F238E27FC236}">
-                <a16:creationId xmlns="" xmlns:a16="http://schemas.microsoft.com/office/drawing/2014/main" id="{5F7265B5-9F97-4F1E-99E9-74F7B7E62337}"/>
+                <a16:creationId xmlns:a16="http://schemas.microsoft.com/office/drawing/2014/main" xmlns="" id="{5F7265B5-9F97-4F1E-99E9-74F7B7E62337}"/>
               </a:ext>
             </a:extLst>
           </p:cNvPr>
@@ -925,7 +925,7 @@
           <p:cNvPr id="11" name="Date Placeholder 10">
             <a:extLst>
               <a:ext uri="{FF2B5EF4-FFF2-40B4-BE49-F238E27FC236}">
-                <a16:creationId xmlns="" xmlns:a16="http://schemas.microsoft.com/office/drawing/2014/main" id="{5C74A470-3BD3-4F33-80E5-67E6E87FCBE7}"/>
+                <a16:creationId xmlns:a16="http://schemas.microsoft.com/office/drawing/2014/main" xmlns="" id="{5C74A470-3BD3-4F33-80E5-67E6E87FCBE7}"/>
               </a:ext>
             </a:extLst>
           </p:cNvPr>
@@ -944,7 +944,7 @@
             <a:fld id="{ED291B17-9318-49DB-B28B-6E5994AE9581}" type="datetime1">
               <a:rPr lang="en-US" smtClean="0"/>
               <a:pPr/>
-              <a:t>4/23/2021</a:t>
+              <a:t>4/29/2021</a:t>
             </a:fld>
             <a:endParaRPr lang="en-US" dirty="0"/>
           </a:p>
@@ -955,7 +955,7 @@
           <p:cNvPr id="12" name="Footer Placeholder 11">
             <a:extLst>
               <a:ext uri="{FF2B5EF4-FFF2-40B4-BE49-F238E27FC236}">
-                <a16:creationId xmlns="" xmlns:a16="http://schemas.microsoft.com/office/drawing/2014/main" id="{9A3A30BA-DB50-4D7D-BCDE-17D20FB354DF}"/>
+                <a16:creationId xmlns:a16="http://schemas.microsoft.com/office/drawing/2014/main" xmlns="" id="{9A3A30BA-DB50-4D7D-BCDE-17D20FB354DF}"/>
               </a:ext>
             </a:extLst>
           </p:cNvPr>
@@ -980,7 +980,7 @@
           <p:cNvPr id="13" name="Slide Number Placeholder 12">
             <a:extLst>
               <a:ext uri="{FF2B5EF4-FFF2-40B4-BE49-F238E27FC236}">
-                <a16:creationId xmlns="" xmlns:a16="http://schemas.microsoft.com/office/drawing/2014/main" id="{76FF9E58-C0B2-436B-A21C-DB45A00D6515}"/>
+                <a16:creationId xmlns:a16="http://schemas.microsoft.com/office/drawing/2014/main" xmlns="" id="{76FF9E58-C0B2-436B-A21C-DB45A00D6515}"/>
               </a:ext>
             </a:extLst>
           </p:cNvPr>
@@ -1008,7 +1008,7 @@
     </p:spTree>
     <p:extLst>
       <p:ext uri="{BB962C8B-B14F-4D97-AF65-F5344CB8AC3E}">
-        <p14:creationId xmlns="" xmlns:p14="http://schemas.microsoft.com/office/powerpoint/2010/main" val="3388849626"/>
+        <p14:creationId xmlns:p14="http://schemas.microsoft.com/office/powerpoint/2010/main" xmlns="" val="3388849626"/>
       </p:ext>
     </p:extLst>
   </p:cSld>
@@ -1125,7 +1125,7 @@
           <p:cNvPr id="8" name="Date Placeholder 7">
             <a:extLst>
               <a:ext uri="{FF2B5EF4-FFF2-40B4-BE49-F238E27FC236}">
-                <a16:creationId xmlns="" xmlns:a16="http://schemas.microsoft.com/office/drawing/2014/main" id="{770E6237-3456-439F-802D-3BA93FC7E3E5}"/>
+                <a16:creationId xmlns:a16="http://schemas.microsoft.com/office/drawing/2014/main" xmlns="" id="{770E6237-3456-439F-802D-3BA93FC7E3E5}"/>
               </a:ext>
             </a:extLst>
           </p:cNvPr>
@@ -1144,7 +1144,7 @@
             <a:fld id="{78DD82B9-B8EE-4375-B6FF-88FA6ABB15D9}" type="datetime1">
               <a:rPr lang="en-US" smtClean="0"/>
               <a:pPr/>
-              <a:t>4/23/2021</a:t>
+              <a:t>4/29/2021</a:t>
             </a:fld>
             <a:endParaRPr lang="en-US" dirty="0"/>
           </a:p>
@@ -1155,7 +1155,7 @@
           <p:cNvPr id="9" name="Footer Placeholder 8">
             <a:extLst>
               <a:ext uri="{FF2B5EF4-FFF2-40B4-BE49-F238E27FC236}">
-                <a16:creationId xmlns="" xmlns:a16="http://schemas.microsoft.com/office/drawing/2014/main" id="{1356D3B5-6063-4A89-B88F-9D3043916FF8}"/>
+                <a16:creationId xmlns:a16="http://schemas.microsoft.com/office/drawing/2014/main" xmlns="" id="{1356D3B5-6063-4A89-B88F-9D3043916FF8}"/>
               </a:ext>
             </a:extLst>
           </p:cNvPr>
@@ -1180,7 +1180,7 @@
           <p:cNvPr id="10" name="Slide Number Placeholder 9">
             <a:extLst>
               <a:ext uri="{FF2B5EF4-FFF2-40B4-BE49-F238E27FC236}">
-                <a16:creationId xmlns="" xmlns:a16="http://schemas.microsoft.com/office/drawing/2014/main" id="{02B78BF7-69D3-4CE0-A631-50EFD41EEEB8}"/>
+                <a16:creationId xmlns:a16="http://schemas.microsoft.com/office/drawing/2014/main" xmlns="" id="{02B78BF7-69D3-4CE0-A631-50EFD41EEEB8}"/>
               </a:ext>
             </a:extLst>
           </p:cNvPr>
@@ -1208,7 +1208,7 @@
     </p:spTree>
     <p:extLst>
       <p:ext uri="{BB962C8B-B14F-4D97-AF65-F5344CB8AC3E}">
-        <p14:creationId xmlns="" xmlns:p14="http://schemas.microsoft.com/office/powerpoint/2010/main" val="852443411"/>
+        <p14:creationId xmlns:p14="http://schemas.microsoft.com/office/powerpoint/2010/main" xmlns="" val="852443411"/>
       </p:ext>
     </p:extLst>
   </p:cSld>
@@ -1439,7 +1439,7 @@
           <p:cNvPr id="7" name="Date Placeholder 6">
             <a:extLst>
               <a:ext uri="{FF2B5EF4-FFF2-40B4-BE49-F238E27FC236}">
-                <a16:creationId xmlns="" xmlns:a16="http://schemas.microsoft.com/office/drawing/2014/main" id="{61582016-5696-4A93-887F-BBB3B9002FE5}"/>
+                <a16:creationId xmlns:a16="http://schemas.microsoft.com/office/drawing/2014/main" xmlns="" id="{61582016-5696-4A93-887F-BBB3B9002FE5}"/>
               </a:ext>
             </a:extLst>
           </p:cNvPr>
@@ -1458,7 +1458,7 @@
             <a:fld id="{B2497495-0637-405E-AE64-5CC7506D51F5}" type="datetime1">
               <a:rPr lang="en-US" smtClean="0"/>
               <a:pPr/>
-              <a:t>4/23/2021</a:t>
+              <a:t>4/29/2021</a:t>
             </a:fld>
             <a:endParaRPr lang="en-US" dirty="0"/>
           </a:p>
@@ -1469,7 +1469,7 @@
           <p:cNvPr id="9" name="Footer Placeholder 8">
             <a:extLst>
               <a:ext uri="{FF2B5EF4-FFF2-40B4-BE49-F238E27FC236}">
-                <a16:creationId xmlns="" xmlns:a16="http://schemas.microsoft.com/office/drawing/2014/main" id="{857CFCD5-1192-4E18-8A8F-29E153B44DA4}"/>
+                <a16:creationId xmlns:a16="http://schemas.microsoft.com/office/drawing/2014/main" xmlns="" id="{857CFCD5-1192-4E18-8A8F-29E153B44DA4}"/>
               </a:ext>
             </a:extLst>
           </p:cNvPr>
@@ -1494,7 +1494,7 @@
           <p:cNvPr id="10" name="Slide Number Placeholder 9">
             <a:extLst>
               <a:ext uri="{FF2B5EF4-FFF2-40B4-BE49-F238E27FC236}">
-                <a16:creationId xmlns="" xmlns:a16="http://schemas.microsoft.com/office/drawing/2014/main" id="{E39A109E-5018-4794-92B3-FD5E5BCD95E8}"/>
+                <a16:creationId xmlns:a16="http://schemas.microsoft.com/office/drawing/2014/main" xmlns="" id="{E39A109E-5018-4794-92B3-FD5E5BCD95E8}"/>
               </a:ext>
             </a:extLst>
           </p:cNvPr>
@@ -1522,7 +1522,7 @@
     </p:spTree>
     <p:extLst>
       <p:ext uri="{BB962C8B-B14F-4D97-AF65-F5344CB8AC3E}">
-        <p14:creationId xmlns="" xmlns:p14="http://schemas.microsoft.com/office/powerpoint/2010/main" val="366680978"/>
+        <p14:creationId xmlns:p14="http://schemas.microsoft.com/office/powerpoint/2010/main" xmlns="" val="366680978"/>
       </p:ext>
     </p:extLst>
   </p:cSld>
@@ -1713,7 +1713,7 @@
             <a:fld id="{7BFFD690-9426-415D-8B65-26881E07B2D4}" type="datetime1">
               <a:rPr lang="en-US" smtClean="0"/>
               <a:pPr/>
-              <a:t>4/23/2021</a:t>
+              <a:t>4/29/2021</a:t>
             </a:fld>
             <a:endParaRPr lang="en-US" dirty="0"/>
           </a:p>
@@ -1765,7 +1765,7 @@
     </p:spTree>
     <p:extLst>
       <p:ext uri="{BB962C8B-B14F-4D97-AF65-F5344CB8AC3E}">
-        <p14:creationId xmlns="" xmlns:p14="http://schemas.microsoft.com/office/powerpoint/2010/main" val="2483323219"/>
+        <p14:creationId xmlns:p14="http://schemas.microsoft.com/office/powerpoint/2010/main" xmlns="" val="2483323219"/>
       </p:ext>
     </p:extLst>
   </p:cSld>
@@ -2137,7 +2137,7 @@
             <a:fld id="{04C4989A-474C-40DE-95B9-011C28B71673}" type="datetime1">
               <a:rPr lang="en-US" smtClean="0"/>
               <a:pPr/>
-              <a:t>4/23/2021</a:t>
+              <a:t>4/29/2021</a:t>
             </a:fld>
             <a:endParaRPr lang="en-US" dirty="0"/>
           </a:p>
@@ -2189,7 +2189,7 @@
     </p:spTree>
     <p:extLst>
       <p:ext uri="{BB962C8B-B14F-4D97-AF65-F5344CB8AC3E}">
-        <p14:creationId xmlns="" xmlns:p14="http://schemas.microsoft.com/office/powerpoint/2010/main" val="1748046589"/>
+        <p14:creationId xmlns:p14="http://schemas.microsoft.com/office/powerpoint/2010/main" xmlns="" val="1748046589"/>
       </p:ext>
     </p:extLst>
   </p:cSld>
@@ -2262,7 +2262,7 @@
             <a:fld id="{5DB4ED54-5B5E-4A04-93D3-5772E3CE3818}" type="datetime1">
               <a:rPr lang="en-US" smtClean="0"/>
               <a:pPr/>
-              <a:t>4/23/2021</a:t>
+              <a:t>4/29/2021</a:t>
             </a:fld>
             <a:endParaRPr lang="en-US" dirty="0"/>
           </a:p>
@@ -2314,7 +2314,7 @@
     </p:spTree>
     <p:extLst>
       <p:ext uri="{BB962C8B-B14F-4D97-AF65-F5344CB8AC3E}">
-        <p14:creationId xmlns="" xmlns:p14="http://schemas.microsoft.com/office/powerpoint/2010/main" val="112936382"/>
+        <p14:creationId xmlns:p14="http://schemas.microsoft.com/office/powerpoint/2010/main" xmlns="" val="112936382"/>
       </p:ext>
     </p:extLst>
   </p:cSld>
@@ -2359,7 +2359,7 @@
             <a:fld id="{4EDE50D6-574B-40AF-946F-D52A04ADE379}" type="datetime1">
               <a:rPr lang="en-US" smtClean="0"/>
               <a:pPr/>
-              <a:t>4/23/2021</a:t>
+              <a:t>4/29/2021</a:t>
             </a:fld>
             <a:endParaRPr lang="en-US" dirty="0"/>
           </a:p>
@@ -2411,7 +2411,7 @@
     </p:spTree>
     <p:extLst>
       <p:ext uri="{BB962C8B-B14F-4D97-AF65-F5344CB8AC3E}">
-        <p14:creationId xmlns="" xmlns:p14="http://schemas.microsoft.com/office/powerpoint/2010/main" val="1129494974"/>
+        <p14:creationId xmlns:p14="http://schemas.microsoft.com/office/powerpoint/2010/main" xmlns="" val="1129494974"/>
       </p:ext>
     </p:extLst>
   </p:cSld>
@@ -2714,7 +2714,7 @@
           <p:cNvPr id="8" name="Date Placeholder 7">
             <a:extLst>
               <a:ext uri="{FF2B5EF4-FFF2-40B4-BE49-F238E27FC236}">
-                <a16:creationId xmlns="" xmlns:a16="http://schemas.microsoft.com/office/drawing/2014/main" id="{0B919CC2-2A65-446F-B538-9E6249035445}"/>
+                <a16:creationId xmlns:a16="http://schemas.microsoft.com/office/drawing/2014/main" xmlns="" id="{0B919CC2-2A65-446F-B538-9E6249035445}"/>
               </a:ext>
             </a:extLst>
           </p:cNvPr>
@@ -2738,7 +2738,7 @@
             <a:fld id="{D82884F1-FFEA-405F-9602-3DCA865EDA4E}" type="datetime1">
               <a:rPr lang="en-US" smtClean="0"/>
               <a:pPr/>
-              <a:t>4/23/2021</a:t>
+              <a:t>4/29/2021</a:t>
             </a:fld>
             <a:endParaRPr lang="en-US" dirty="0"/>
           </a:p>
@@ -2749,7 +2749,7 @@
           <p:cNvPr id="10" name="Footer Placeholder 9">
             <a:extLst>
               <a:ext uri="{FF2B5EF4-FFF2-40B4-BE49-F238E27FC236}">
-                <a16:creationId xmlns="" xmlns:a16="http://schemas.microsoft.com/office/drawing/2014/main" id="{B72412AE-119E-4982-8B24-63365EFCA796}"/>
+                <a16:creationId xmlns:a16="http://schemas.microsoft.com/office/drawing/2014/main" xmlns="" id="{B72412AE-119E-4982-8B24-63365EFCA796}"/>
               </a:ext>
             </a:extLst>
           </p:cNvPr>
@@ -2779,7 +2779,7 @@
           <p:cNvPr id="11" name="Slide Number Placeholder 10">
             <a:extLst>
               <a:ext uri="{FF2B5EF4-FFF2-40B4-BE49-F238E27FC236}">
-                <a16:creationId xmlns="" xmlns:a16="http://schemas.microsoft.com/office/drawing/2014/main" id="{7FC4BB19-6AD1-45CF-9F99-00B109890FAB}"/>
+                <a16:creationId xmlns:a16="http://schemas.microsoft.com/office/drawing/2014/main" xmlns="" id="{7FC4BB19-6AD1-45CF-9F99-00B109890FAB}"/>
               </a:ext>
             </a:extLst>
           </p:cNvPr>
@@ -2812,7 +2812,7 @@
     </p:spTree>
     <p:extLst>
       <p:ext uri="{BB962C8B-B14F-4D97-AF65-F5344CB8AC3E}">
-        <p14:creationId xmlns="" xmlns:p14="http://schemas.microsoft.com/office/powerpoint/2010/main" val="1261766693"/>
+        <p14:creationId xmlns:p14="http://schemas.microsoft.com/office/powerpoint/2010/main" xmlns="" val="1261766693"/>
       </p:ext>
     </p:extLst>
   </p:cSld>
@@ -3032,7 +3032,7 @@
             <a:fld id="{7E18DB4A-8810-4A10-AD5C-D5E2C667F5B3}" type="datetime1">
               <a:rPr lang="en-US" smtClean="0"/>
               <a:pPr/>
-              <a:t>4/23/2021</a:t>
+              <a:t>4/29/2021</a:t>
             </a:fld>
             <a:endParaRPr lang="en-US" dirty="0"/>
           </a:p>
@@ -3085,7 +3085,7 @@
     </p:spTree>
     <p:extLst>
       <p:ext uri="{BB962C8B-B14F-4D97-AF65-F5344CB8AC3E}">
-        <p14:creationId xmlns="" xmlns:p14="http://schemas.microsoft.com/office/powerpoint/2010/main" val="3573289553"/>
+        <p14:creationId xmlns:p14="http://schemas.microsoft.com/office/powerpoint/2010/main" xmlns="" val="3573289553"/>
       </p:ext>
     </p:extLst>
   </p:cSld>
@@ -3249,7 +3249,7 @@
             <a:fld id="{ED291B17-9318-49DB-B28B-6E5994AE9581}" type="datetime1">
               <a:rPr lang="en-US" smtClean="0"/>
               <a:pPr/>
-              <a:t>4/23/2021</a:t>
+              <a:t>4/29/2021</a:t>
             </a:fld>
             <a:endParaRPr lang="en-US" dirty="0"/>
           </a:p>
@@ -3450,7 +3450,7 @@
     </p:spTree>
     <p:extLst>
       <p:ext uri="{BB962C8B-B14F-4D97-AF65-F5344CB8AC3E}">
-        <p14:creationId xmlns="" xmlns:p14="http://schemas.microsoft.com/office/powerpoint/2010/main" val="3000897896"/>
+        <p14:creationId xmlns:p14="http://schemas.microsoft.com/office/powerpoint/2010/main" xmlns="" val="3000897896"/>
       </p:ext>
     </p:extLst>
   </p:cSld>
@@ -3895,10 +3895,10 @@
           <p:cNvPr id="18" name="Rectangle 17">
             <a:extLst>
               <a:ext uri="{FF2B5EF4-FFF2-40B4-BE49-F238E27FC236}">
-                <a16:creationId xmlns="" xmlns:a16="http://schemas.microsoft.com/office/drawing/2014/main" id="{D6D7A0BC-0046-4CAA-8E7F-DCAFE511EA0E}"/>
+                <a16:creationId xmlns:a16="http://schemas.microsoft.com/office/drawing/2014/main" xmlns="" id="{D6D7A0BC-0046-4CAA-8E7F-DCAFE511EA0E}"/>
               </a:ext>
               <a:ext uri="{C183D7F6-B498-43B3-948B-1728B52AA6E4}">
-                <adec:decorative xmlns="" xmlns:adec="http://schemas.microsoft.com/office/drawing/2017/decorative" val="1"/>
+                <adec:decorative xmlns:adec="http://schemas.microsoft.com/office/drawing/2017/decorative" xmlns="" val="1"/>
               </a:ext>
             </a:extLst>
           </p:cNvPr>
@@ -3908,7 +3908,7 @@
           <p:nvPr>
             <p:extLst>
               <p:ext uri="{386F3935-93C4-4BCD-93E2-E3B085C9AB24}">
-                <p16:designElem xmlns="" xmlns:p16="http://schemas.microsoft.com/office/powerpoint/2015/main" val="1"/>
+                <p16:designElem xmlns:p16="http://schemas.microsoft.com/office/powerpoint/2015/main" xmlns="" val="1"/>
               </p:ext>
             </p:extLst>
           </p:nvPr>
@@ -3955,7 +3955,7 @@
           <p:cNvPr id="2" name="Title 1">
             <a:extLst>
               <a:ext uri="{FF2B5EF4-FFF2-40B4-BE49-F238E27FC236}">
-                <a16:creationId xmlns="" xmlns:a16="http://schemas.microsoft.com/office/drawing/2014/main" id="{1C21E816-31F5-48BB-BD02-D15F2F18B48A}"/>
+                <a16:creationId xmlns:a16="http://schemas.microsoft.com/office/drawing/2014/main" xmlns="" id="{1C21E816-31F5-48BB-BD02-D15F2F18B48A}"/>
               </a:ext>
             </a:extLst>
           </p:cNvPr>
@@ -4003,7 +4003,7 @@
           <p:cNvPr id="3" name="Subtitle 2">
             <a:extLst>
               <a:ext uri="{FF2B5EF4-FFF2-40B4-BE49-F238E27FC236}">
-                <a16:creationId xmlns="" xmlns:a16="http://schemas.microsoft.com/office/drawing/2014/main" id="{835D6E6B-3353-491C-A3C6-F278D6CED8B3}"/>
+                <a16:creationId xmlns:a16="http://schemas.microsoft.com/office/drawing/2014/main" xmlns="" id="{835D6E6B-3353-491C-A3C6-F278D6CED8B3}"/>
               </a:ext>
             </a:extLst>
           </p:cNvPr>
@@ -4046,10 +4046,10 @@
           <p:cNvPr id="20" name="Rectangle 19">
             <a:extLst>
               <a:ext uri="{FF2B5EF4-FFF2-40B4-BE49-F238E27FC236}">
-                <a16:creationId xmlns="" xmlns:a16="http://schemas.microsoft.com/office/drawing/2014/main" id="{E7C6334F-6411-41EC-AD7D-179EDD8B58CB}"/>
+                <a16:creationId xmlns:a16="http://schemas.microsoft.com/office/drawing/2014/main" xmlns="" id="{E7C6334F-6411-41EC-AD7D-179EDD8B58CB}"/>
               </a:ext>
               <a:ext uri="{C183D7F6-B498-43B3-948B-1728B52AA6E4}">
-                <adec:decorative xmlns="" xmlns:adec="http://schemas.microsoft.com/office/drawing/2017/decorative" val="1"/>
+                <adec:decorative xmlns:adec="http://schemas.microsoft.com/office/drawing/2017/decorative" xmlns="" val="1"/>
               </a:ext>
             </a:extLst>
           </p:cNvPr>
@@ -4059,7 +4059,7 @@
           <p:nvPr>
             <p:extLst>
               <p:ext uri="{386F3935-93C4-4BCD-93E2-E3B085C9AB24}">
-                <p16:designElem xmlns="" xmlns:p16="http://schemas.microsoft.com/office/powerpoint/2015/main" val="1"/>
+                <p16:designElem xmlns:p16="http://schemas.microsoft.com/office/powerpoint/2015/main" xmlns="" val="1"/>
               </p:ext>
             </p:extLst>
           </p:nvPr>
@@ -4100,10 +4100,10 @@
           <p:cNvPr id="22" name="Rectangle 21">
             <a:extLst>
               <a:ext uri="{FF2B5EF4-FFF2-40B4-BE49-F238E27FC236}">
-                <a16:creationId xmlns="" xmlns:a16="http://schemas.microsoft.com/office/drawing/2014/main" id="{E6B02CEE-3AF8-4349-9B3E-8970E6DF62B3}"/>
+                <a16:creationId xmlns:a16="http://schemas.microsoft.com/office/drawing/2014/main" xmlns="" id="{E6B02CEE-3AF8-4349-9B3E-8970E6DF62B3}"/>
               </a:ext>
               <a:ext uri="{C183D7F6-B498-43B3-948B-1728B52AA6E4}">
-                <adec:decorative xmlns="" xmlns:adec="http://schemas.microsoft.com/office/drawing/2017/decorative" val="1"/>
+                <adec:decorative xmlns:adec="http://schemas.microsoft.com/office/drawing/2017/decorative" xmlns="" val="1"/>
               </a:ext>
             </a:extLst>
           </p:cNvPr>
@@ -4113,7 +4113,7 @@
           <p:nvPr>
             <p:extLst>
               <p:ext uri="{386F3935-93C4-4BCD-93E2-E3B085C9AB24}">
-                <p16:designElem xmlns="" xmlns:p16="http://schemas.microsoft.com/office/powerpoint/2015/main" val="1"/>
+                <p16:designElem xmlns:p16="http://schemas.microsoft.com/office/powerpoint/2015/main" xmlns="" val="1"/>
               </p:ext>
             </p:extLst>
           </p:nvPr>
@@ -4154,10 +4154,10 @@
           <p:cNvPr id="24" name="Rectangle 23">
             <a:extLst>
               <a:ext uri="{FF2B5EF4-FFF2-40B4-BE49-F238E27FC236}">
-                <a16:creationId xmlns="" xmlns:a16="http://schemas.microsoft.com/office/drawing/2014/main" id="{AAA01CF0-3FB5-44EB-B7DE-F2E86374C2FB}"/>
+                <a16:creationId xmlns:a16="http://schemas.microsoft.com/office/drawing/2014/main" xmlns="" id="{AAA01CF0-3FB5-44EB-B7DE-F2E86374C2FB}"/>
               </a:ext>
               <a:ext uri="{C183D7F6-B498-43B3-948B-1728B52AA6E4}">
-                <adec:decorative xmlns="" xmlns:adec="http://schemas.microsoft.com/office/drawing/2017/decorative" val="1"/>
+                <adec:decorative xmlns:adec="http://schemas.microsoft.com/office/drawing/2017/decorative" xmlns="" val="1"/>
               </a:ext>
             </a:extLst>
           </p:cNvPr>
@@ -4167,7 +4167,7 @@
           <p:nvPr>
             <p:extLst>
               <p:ext uri="{386F3935-93C4-4BCD-93E2-E3B085C9AB24}">
-                <p16:designElem xmlns="" xmlns:p16="http://schemas.microsoft.com/office/powerpoint/2015/main" val="1"/>
+                <p16:designElem xmlns:p16="http://schemas.microsoft.com/office/powerpoint/2015/main" xmlns="" val="1"/>
               </p:ext>
             </p:extLst>
           </p:nvPr>
@@ -4208,7 +4208,7 @@
           <p:cNvPr id="6" name="Picture 5">
             <a:extLst>
               <a:ext uri="{FF2B5EF4-FFF2-40B4-BE49-F238E27FC236}">
-                <a16:creationId xmlns="" xmlns:a16="http://schemas.microsoft.com/office/drawing/2014/main" id="{F1A8C364-94D4-4630-BAD0-78722F347055}"/>
+                <a16:creationId xmlns:a16="http://schemas.microsoft.com/office/drawing/2014/main" xmlns="" id="{F1A8C364-94D4-4630-BAD0-78722F347055}"/>
               </a:ext>
             </a:extLst>
           </p:cNvPr>
@@ -4237,7 +4237,7 @@
           <p:cNvPr id="5" name="Picture 4">
             <a:extLst>
               <a:ext uri="{FF2B5EF4-FFF2-40B4-BE49-F238E27FC236}">
-                <a16:creationId xmlns="" xmlns:a16="http://schemas.microsoft.com/office/drawing/2014/main" id="{2DF2DA5F-92AD-4BB3-A745-CA1ECB503B1F}"/>
+                <a16:creationId xmlns:a16="http://schemas.microsoft.com/office/drawing/2014/main" xmlns="" id="{2DF2DA5F-92AD-4BB3-A745-CA1ECB503B1F}"/>
               </a:ext>
             </a:extLst>
           </p:cNvPr>
@@ -4265,13 +4265,20 @@
     </p:spTree>
     <p:extLst>
       <p:ext uri="{BB962C8B-B14F-4D97-AF65-F5344CB8AC3E}">
-        <p14:creationId xmlns="" xmlns:p14="http://schemas.microsoft.com/office/powerpoint/2010/main" val="2475805559"/>
+        <p14:creationId xmlns:p14="http://schemas.microsoft.com/office/powerpoint/2010/main" xmlns="" val="2475805559"/>
       </p:ext>
     </p:extLst>
   </p:cSld>
   <p:clrMapOvr>
     <a:masterClrMapping/>
   </p:clrMapOvr>
+  <p:timing>
+    <p:tnLst>
+      <p:par>
+        <p:cTn id="1" dur="indefinite" restart="never" nodeType="tmRoot"/>
+      </p:par>
+    </p:tnLst>
+  </p:timing>
 </p:sld>
 </file>
 
@@ -4297,7 +4304,7 @@
           <p:cNvPr id="2" name="Title 1">
             <a:extLst>
               <a:ext uri="{FF2B5EF4-FFF2-40B4-BE49-F238E27FC236}">
-                <a16:creationId xmlns="" xmlns:a16="http://schemas.microsoft.com/office/drawing/2014/main" id="{B332D024-7CF7-40A7-8F6F-984DC362FDF1}"/>
+                <a16:creationId xmlns:a16="http://schemas.microsoft.com/office/drawing/2014/main" xmlns="" id="{B332D024-7CF7-40A7-8F6F-984DC362FDF1}"/>
               </a:ext>
             </a:extLst>
           </p:cNvPr>
@@ -4325,7 +4332,7 @@
           <p:cNvPr id="3" name="Content Placeholder 2">
             <a:extLst>
               <a:ext uri="{FF2B5EF4-FFF2-40B4-BE49-F238E27FC236}">
-                <a16:creationId xmlns="" xmlns:a16="http://schemas.microsoft.com/office/drawing/2014/main" id="{1361F634-45EC-4A65-94AE-CFEB178B8661}"/>
+                <a16:creationId xmlns:a16="http://schemas.microsoft.com/office/drawing/2014/main" xmlns="" id="{1361F634-45EC-4A65-94AE-CFEB178B8661}"/>
               </a:ext>
             </a:extLst>
           </p:cNvPr>
@@ -4354,37 +4361,7 @@
                 <a:effectLst/>
                 <a:latin typeface="-apple-system"/>
               </a:rPr>
-              <a:t>The protocol can </a:t>
-            </a:r>
-            <a:r>
-              <a:rPr lang="en-US" b="0" i="0" dirty="0" smtClean="0">
-                <a:solidFill>
-                  <a:srgbClr val="24292E"/>
-                </a:solidFill>
-                <a:effectLst/>
-                <a:latin typeface="-apple-system"/>
-              </a:rPr>
-              <a:t>be used as </a:t>
-            </a:r>
-            <a:r>
-              <a:rPr lang="en-US" b="0" i="0" dirty="0" smtClean="0">
-                <a:solidFill>
-                  <a:srgbClr val="24292E"/>
-                </a:solidFill>
-                <a:effectLst/>
-                <a:latin typeface="-apple-system"/>
-              </a:rPr>
-              <a:t>either of the 4 </a:t>
-            </a:r>
-            <a:r>
-              <a:rPr lang="en-US" b="0" i="0" dirty="0" smtClean="0">
-                <a:solidFill>
-                  <a:srgbClr val="24292E"/>
-                </a:solidFill>
-                <a:effectLst/>
-                <a:latin typeface="-apple-system"/>
-              </a:rPr>
-              <a:t>different types of </a:t>
+              <a:t>The protocol can be used as either of the 4 different types of </a:t>
             </a:r>
             <a:r>
               <a:rPr lang="en-US" b="0" i="0" dirty="0" err="1" smtClean="0">
@@ -4403,16 +4380,7 @@
                 </a:solidFill>
                 <a:latin typeface="-apple-system"/>
               </a:rPr>
-              <a:t>  </a:t>
-            </a:r>
-            <a:r>
-              <a:rPr lang="en-US" dirty="0" smtClean="0">
-                <a:solidFill>
-                  <a:srgbClr val="24292E"/>
-                </a:solidFill>
-                <a:latin typeface="-apple-system"/>
-              </a:rPr>
-              <a:t>i.e. for any type of industry use cases, in order to power their own cloud servers.</a:t>
+              <a:t>  i.e. for any type of industry use cases, in order to power their own cloud servers.</a:t>
             </a:r>
           </a:p>
           <a:p>
@@ -4508,7 +4476,7 @@
           <p:cNvPr id="5" name="Picture 4">
             <a:extLst>
               <a:ext uri="{FF2B5EF4-FFF2-40B4-BE49-F238E27FC236}">
-                <a16:creationId xmlns="" xmlns:a16="http://schemas.microsoft.com/office/drawing/2014/main" id="{F537BEB0-FF60-41FD-BF15-88BEB38D8587}"/>
+                <a16:creationId xmlns:a16="http://schemas.microsoft.com/office/drawing/2014/main" xmlns="" id="{F537BEB0-FF60-41FD-BF15-88BEB38D8587}"/>
               </a:ext>
             </a:extLst>
           </p:cNvPr>
@@ -4536,7 +4504,7 @@
     </p:spTree>
     <p:extLst>
       <p:ext uri="{BB962C8B-B14F-4D97-AF65-F5344CB8AC3E}">
-        <p14:creationId xmlns="" xmlns:p14="http://schemas.microsoft.com/office/powerpoint/2010/main" val="588069994"/>
+        <p14:creationId xmlns:p14="http://schemas.microsoft.com/office/powerpoint/2010/main" xmlns="" val="588069994"/>
       </p:ext>
     </p:extLst>
   </p:cSld>
@@ -4568,7 +4536,7 @@
           <p:cNvPr id="2" name="Title 1">
             <a:extLst>
               <a:ext uri="{FF2B5EF4-FFF2-40B4-BE49-F238E27FC236}">
-                <a16:creationId xmlns="" xmlns:a16="http://schemas.microsoft.com/office/drawing/2014/main" id="{DBC6775C-1BF0-434F-A429-28C52C8BEFD7}"/>
+                <a16:creationId xmlns:a16="http://schemas.microsoft.com/office/drawing/2014/main" xmlns="" id="{DBC6775C-1BF0-434F-A429-28C52C8BEFD7}"/>
               </a:ext>
             </a:extLst>
           </p:cNvPr>
@@ -4626,7 +4594,7 @@
           <p:cNvPr id="3" name="Picture 2">
             <a:extLst>
               <a:ext uri="{FF2B5EF4-FFF2-40B4-BE49-F238E27FC236}">
-                <a16:creationId xmlns="" xmlns:a16="http://schemas.microsoft.com/office/drawing/2014/main" id="{23290E1D-59B3-445E-8085-B4BA2CF51FB1}"/>
+                <a16:creationId xmlns:a16="http://schemas.microsoft.com/office/drawing/2014/main" xmlns="" id="{23290E1D-59B3-445E-8085-B4BA2CF51FB1}"/>
               </a:ext>
             </a:extLst>
           </p:cNvPr>
@@ -4654,7 +4622,7 @@
     </p:spTree>
     <p:extLst>
       <p:ext uri="{BB962C8B-B14F-4D97-AF65-F5344CB8AC3E}">
-        <p14:creationId xmlns="" xmlns:p14="http://schemas.microsoft.com/office/powerpoint/2010/main" val="3315502033"/>
+        <p14:creationId xmlns:p14="http://schemas.microsoft.com/office/powerpoint/2010/main" xmlns="" val="3315502033"/>
       </p:ext>
     </p:extLst>
   </p:cSld>
@@ -4687,7 +4655,7 @@
             <a:hlinkClick r:id="rId2"/>
             <a:extLst>
               <a:ext uri="{FF2B5EF4-FFF2-40B4-BE49-F238E27FC236}">
-                <a16:creationId xmlns="" xmlns:a16="http://schemas.microsoft.com/office/drawing/2014/main" id="{63816459-461E-4B4F-81FA-AF665B4B7FBF}"/>
+                <a16:creationId xmlns:a16="http://schemas.microsoft.com/office/drawing/2014/main" xmlns="" id="{63816459-461E-4B4F-81FA-AF665B4B7FBF}"/>
               </a:ext>
             </a:extLst>
           </p:cNvPr>
@@ -4716,7 +4684,7 @@
           <p:cNvPr id="4" name="Picture 3">
             <a:extLst>
               <a:ext uri="{FF2B5EF4-FFF2-40B4-BE49-F238E27FC236}">
-                <a16:creationId xmlns="" xmlns:a16="http://schemas.microsoft.com/office/drawing/2014/main" id="{448DD441-D7B1-4AAC-90BF-1D766109F833}"/>
+                <a16:creationId xmlns:a16="http://schemas.microsoft.com/office/drawing/2014/main" xmlns="" id="{448DD441-D7B1-4AAC-90BF-1D766109F833}"/>
               </a:ext>
             </a:extLst>
           </p:cNvPr>
@@ -4744,7 +4712,7 @@
     </p:spTree>
     <p:extLst>
       <p:ext uri="{BB962C8B-B14F-4D97-AF65-F5344CB8AC3E}">
-        <p14:creationId xmlns="" xmlns:p14="http://schemas.microsoft.com/office/powerpoint/2010/main" val="13144033"/>
+        <p14:creationId xmlns:p14="http://schemas.microsoft.com/office/powerpoint/2010/main" xmlns="" val="13144033"/>
       </p:ext>
     </p:extLst>
   </p:cSld>
@@ -4776,7 +4744,7 @@
           <p:cNvPr id="2" name="Title 1">
             <a:extLst>
               <a:ext uri="{FF2B5EF4-FFF2-40B4-BE49-F238E27FC236}">
-                <a16:creationId xmlns="" xmlns:a16="http://schemas.microsoft.com/office/drawing/2014/main" id="{DBC6775C-1BF0-434F-A429-28C52C8BEFD7}"/>
+                <a16:creationId xmlns:a16="http://schemas.microsoft.com/office/drawing/2014/main" xmlns="" id="{DBC6775C-1BF0-434F-A429-28C52C8BEFD7}"/>
               </a:ext>
             </a:extLst>
           </p:cNvPr>
@@ -4827,7 +4795,7 @@
           <p:cNvPr id="3" name="Picture 2">
             <a:extLst>
               <a:ext uri="{FF2B5EF4-FFF2-40B4-BE49-F238E27FC236}">
-                <a16:creationId xmlns="" xmlns:a16="http://schemas.microsoft.com/office/drawing/2014/main" id="{23290E1D-59B3-445E-8085-B4BA2CF51FB1}"/>
+                <a16:creationId xmlns:a16="http://schemas.microsoft.com/office/drawing/2014/main" xmlns="" id="{23290E1D-59B3-445E-8085-B4BA2CF51FB1}"/>
               </a:ext>
             </a:extLst>
           </p:cNvPr>
@@ -4855,7 +4823,7 @@
     </p:spTree>
     <p:extLst>
       <p:ext uri="{BB962C8B-B14F-4D97-AF65-F5344CB8AC3E}">
-        <p14:creationId xmlns="" xmlns:p14="http://schemas.microsoft.com/office/powerpoint/2010/main" val="3315502033"/>
+        <p14:creationId xmlns:p14="http://schemas.microsoft.com/office/powerpoint/2010/main" xmlns="" val="3315502033"/>
       </p:ext>
     </p:extLst>
   </p:cSld>
@@ -4931,7 +4899,7 @@
             <p:cNvPr id="4" name="TextBox 3">
               <a:extLst>
                 <a:ext uri="{FF2B5EF4-FFF2-40B4-BE49-F238E27FC236}">
-                  <a16:creationId xmlns="" xmlns:a16="http://schemas.microsoft.com/office/drawing/2014/main" id="{9674CE2F-8E4B-4E87-8AD5-2A4452B2662D}"/>
+                  <a16:creationId xmlns:a16="http://schemas.microsoft.com/office/drawing/2014/main" xmlns="" id="{9674CE2F-8E4B-4E87-8AD5-2A4452B2662D}"/>
                 </a:ext>
               </a:extLst>
             </p:cNvPr>
@@ -5044,7 +5012,7 @@
           <p:cNvPr id="2" name="Title 1">
             <a:extLst>
               <a:ext uri="{FF2B5EF4-FFF2-40B4-BE49-F238E27FC236}">
-                <a16:creationId xmlns="" xmlns:a16="http://schemas.microsoft.com/office/drawing/2014/main" id="{5E562972-3449-42D1-8185-B4BEFD52AB44}"/>
+                <a16:creationId xmlns:a16="http://schemas.microsoft.com/office/drawing/2014/main" xmlns="" id="{5E562972-3449-42D1-8185-B4BEFD52AB44}"/>
               </a:ext>
             </a:extLst>
           </p:cNvPr>
@@ -5055,7 +5023,12 @@
             <p:ph type="title"/>
           </p:nvPr>
         </p:nvSpPr>
-        <p:spPr/>
+        <p:spPr>
+          <a:xfrm>
+            <a:off x="497110" y="281743"/>
+            <a:ext cx="11029616" cy="1188720"/>
+          </a:xfrm>
+        </p:spPr>
         <p:txBody>
           <a:bodyPr/>
           <a:lstStyle/>
@@ -5072,7 +5045,7 @@
           <p:cNvPr id="5" name="Content Placeholder 4">
             <a:extLst>
               <a:ext uri="{FF2B5EF4-FFF2-40B4-BE49-F238E27FC236}">
-                <a16:creationId xmlns="" xmlns:a16="http://schemas.microsoft.com/office/drawing/2014/main" id="{926AD263-543C-4FCA-8623-005292E20604}"/>
+                <a16:creationId xmlns:a16="http://schemas.microsoft.com/office/drawing/2014/main" xmlns="" id="{926AD263-543C-4FCA-8623-005292E20604}"/>
               </a:ext>
             </a:extLst>
           </p:cNvPr>
@@ -5085,38 +5058,352 @@
         </p:nvSpPr>
         <p:spPr>
           <a:xfrm>
-            <a:off x="581193" y="2340864"/>
-            <a:ext cx="6355636" cy="3634486"/>
+            <a:off x="528640" y="1702676"/>
+            <a:ext cx="6744517" cy="5418082"/>
           </a:xfrm>
         </p:spPr>
         <p:txBody>
           <a:bodyPr>
-            <a:normAutofit/>
+            <a:normAutofit fontScale="92500" lnSpcReduction="20000"/>
           </a:bodyPr>
           <a:lstStyle/>
           <a:p>
             <a:r>
-              <a:rPr lang="en-US" dirty="0">
+              <a:rPr lang="en-US" dirty="0" smtClean="0">
                 <a:hlinkClick r:id="rId2" action="ppaction://hlinksldjump"/>
               </a:rPr>
               <a:t>Overview</a:t>
             </a:r>
-            <a:endParaRPr lang="en-US" dirty="0"/>
+            <a:r>
+              <a:rPr lang="en-US" dirty="0" smtClean="0"/>
+              <a:t/>
+            </a:r>
+            <a:br>
+              <a:rPr lang="en-US" dirty="0" smtClean="0"/>
+            </a:br>
+            <a:r>
+              <a:rPr lang="en-US" dirty="0" smtClean="0">
+                <a:latin typeface="Aparajita" pitchFamily="18" charset="0"/>
+                <a:cs typeface="Aparajita" pitchFamily="18" charset="0"/>
+              </a:rPr>
+              <a:t>- Two General’s Problem</a:t>
+            </a:r>
+            <a:br>
+              <a:rPr lang="en-US" dirty="0" smtClean="0">
+                <a:latin typeface="Aparajita" pitchFamily="18" charset="0"/>
+                <a:cs typeface="Aparajita" pitchFamily="18" charset="0"/>
+              </a:rPr>
+            </a:br>
+            <a:r>
+              <a:rPr lang="en-US" dirty="0" smtClean="0">
+                <a:latin typeface="Aparajita" pitchFamily="18" charset="0"/>
+                <a:cs typeface="Aparajita" pitchFamily="18" charset="0"/>
+              </a:rPr>
+              <a:t>- </a:t>
+            </a:r>
+            <a:r>
+              <a:rPr lang="en-US" dirty="0" err="1" smtClean="0">
+                <a:latin typeface="Aparajita" pitchFamily="18" charset="0"/>
+                <a:cs typeface="Aparajita" pitchFamily="18" charset="0"/>
+              </a:rPr>
+              <a:t>Blockchain</a:t>
+            </a:r>
+            <a:r>
+              <a:rPr lang="en-US" dirty="0" smtClean="0">
+                <a:latin typeface="Aparajita" pitchFamily="18" charset="0"/>
+                <a:cs typeface="Aparajita" pitchFamily="18" charset="0"/>
+              </a:rPr>
+              <a:t/>
+            </a:r>
+            <a:br>
+              <a:rPr lang="en-US" dirty="0" smtClean="0">
+                <a:latin typeface="Aparajita" pitchFamily="18" charset="0"/>
+                <a:cs typeface="Aparajita" pitchFamily="18" charset="0"/>
+              </a:rPr>
+            </a:br>
+            <a:r>
+              <a:rPr lang="en-US" dirty="0" smtClean="0">
+                <a:latin typeface="Aparajita" pitchFamily="18" charset="0"/>
+                <a:cs typeface="Aparajita" pitchFamily="18" charset="0"/>
+              </a:rPr>
+              <a:t>- Consensus</a:t>
+            </a:r>
+            <a:br>
+              <a:rPr lang="en-US" dirty="0" smtClean="0">
+                <a:latin typeface="Aparajita" pitchFamily="18" charset="0"/>
+                <a:cs typeface="Aparajita" pitchFamily="18" charset="0"/>
+              </a:rPr>
+            </a:br>
+            <a:r>
+              <a:rPr lang="en-US" dirty="0" smtClean="0">
+                <a:latin typeface="Aparajita" pitchFamily="18" charset="0"/>
+                <a:cs typeface="Aparajita" pitchFamily="18" charset="0"/>
+              </a:rPr>
+              <a:t>- </a:t>
+            </a:r>
+            <a:r>
+              <a:rPr lang="en-US" dirty="0" err="1" smtClean="0">
+                <a:latin typeface="Aparajita" pitchFamily="18" charset="0"/>
+                <a:cs typeface="Aparajita" pitchFamily="18" charset="0"/>
+              </a:rPr>
+              <a:t>Cryptocurrency</a:t>
+            </a:r>
+            <a:r>
+              <a:rPr lang="en-US" dirty="0" smtClean="0">
+                <a:latin typeface="Aparajita" pitchFamily="18" charset="0"/>
+                <a:cs typeface="Aparajita" pitchFamily="18" charset="0"/>
+              </a:rPr>
+              <a:t/>
+            </a:r>
+            <a:br>
+              <a:rPr lang="en-US" dirty="0" smtClean="0">
+                <a:latin typeface="Aparajita" pitchFamily="18" charset="0"/>
+                <a:cs typeface="Aparajita" pitchFamily="18" charset="0"/>
+              </a:rPr>
+            </a:br>
+            <a:r>
+              <a:rPr lang="en-US" dirty="0" smtClean="0">
+                <a:latin typeface="Aparajita" pitchFamily="18" charset="0"/>
+                <a:cs typeface="Aparajita" pitchFamily="18" charset="0"/>
+              </a:rPr>
+              <a:t>- ETH </a:t>
+            </a:r>
+            <a:r>
+              <a:rPr lang="en-US" dirty="0" err="1" smtClean="0">
+                <a:latin typeface="Aparajita" pitchFamily="18" charset="0"/>
+                <a:cs typeface="Aparajita" pitchFamily="18" charset="0"/>
+              </a:rPr>
+              <a:t>vs</a:t>
+            </a:r>
+            <a:r>
+              <a:rPr lang="en-US" dirty="0" smtClean="0">
+                <a:latin typeface="Aparajita" pitchFamily="18" charset="0"/>
+                <a:cs typeface="Aparajita" pitchFamily="18" charset="0"/>
+              </a:rPr>
+              <a:t> EOS</a:t>
+            </a:r>
+            <a:br>
+              <a:rPr lang="en-US" dirty="0" smtClean="0">
+                <a:latin typeface="Aparajita" pitchFamily="18" charset="0"/>
+                <a:cs typeface="Aparajita" pitchFamily="18" charset="0"/>
+              </a:rPr>
+            </a:br>
+            <a:r>
+              <a:rPr lang="en-US" dirty="0" smtClean="0">
+                <a:latin typeface="Aparajita" pitchFamily="18" charset="0"/>
+                <a:cs typeface="Aparajita" pitchFamily="18" charset="0"/>
+              </a:rPr>
+              <a:t>- Why EOSIO?</a:t>
+            </a:r>
+            <a:endParaRPr lang="en-US" dirty="0">
+              <a:latin typeface="Aparajita" pitchFamily="18" charset="0"/>
+              <a:cs typeface="Aparajita" pitchFamily="18" charset="0"/>
+            </a:endParaRPr>
           </a:p>
           <a:p>
             <a:r>
               <a:rPr lang="en-US" dirty="0">
                 <a:hlinkClick r:id="rId3" action="ppaction://hlinksldjump"/>
               </a:rPr>
-              <a:t>Block Explorer</a:t>
-            </a:r>
-            <a:endParaRPr lang="en-US" dirty="0"/>
-          </a:p>
-          <a:p>
+              <a:t>Block </a:t>
+            </a:r>
+            <a:r>
+              <a:rPr lang="en-US" dirty="0" smtClean="0">
+                <a:hlinkClick r:id="rId3" action="ppaction://hlinksldjump"/>
+              </a:rPr>
+              <a:t>Explorer</a:t>
+            </a:r>
             <a:r>
               <a:rPr lang="en-US" dirty="0" smtClean="0"/>
+              <a:t/>
+            </a:r>
+            <a:br>
+              <a:rPr lang="en-US" dirty="0" smtClean="0"/>
+            </a:br>
+            <a:r>
+              <a:rPr lang="en-US" dirty="0" smtClean="0">
+                <a:latin typeface="Aparajita" pitchFamily="18" charset="0"/>
+                <a:cs typeface="Aparajita" pitchFamily="18" charset="0"/>
+              </a:rPr>
+              <a:t>- Producer/Miner/</a:t>
+            </a:r>
+            <a:r>
+              <a:rPr lang="en-US" dirty="0" err="1" smtClean="0">
+                <a:latin typeface="Aparajita" pitchFamily="18" charset="0"/>
+                <a:cs typeface="Aparajita" pitchFamily="18" charset="0"/>
+              </a:rPr>
+              <a:t>Validator</a:t>
+            </a:r>
+            <a:r>
+              <a:rPr lang="en-US" dirty="0" smtClean="0">
+                <a:latin typeface="Aparajita" pitchFamily="18" charset="0"/>
+                <a:cs typeface="Aparajita" pitchFamily="18" charset="0"/>
+              </a:rPr>
+              <a:t/>
+            </a:r>
+            <a:br>
+              <a:rPr lang="en-US" dirty="0" smtClean="0">
+                <a:latin typeface="Aparajita" pitchFamily="18" charset="0"/>
+                <a:cs typeface="Aparajita" pitchFamily="18" charset="0"/>
+              </a:rPr>
+            </a:br>
+            <a:r>
+              <a:rPr lang="en-US" dirty="0" smtClean="0">
+                <a:latin typeface="Aparajita" pitchFamily="18" charset="0"/>
+                <a:cs typeface="Aparajita" pitchFamily="18" charset="0"/>
+              </a:rPr>
+              <a:t>- Blocks</a:t>
+            </a:r>
+            <a:br>
+              <a:rPr lang="en-US" dirty="0" smtClean="0">
+                <a:latin typeface="Aparajita" pitchFamily="18" charset="0"/>
+                <a:cs typeface="Aparajita" pitchFamily="18" charset="0"/>
+              </a:rPr>
+            </a:br>
+            <a:r>
+              <a:rPr lang="en-US" dirty="0" smtClean="0">
+                <a:latin typeface="Aparajita" pitchFamily="18" charset="0"/>
+                <a:cs typeface="Aparajita" pitchFamily="18" charset="0"/>
+              </a:rPr>
+              <a:t>- Transactions</a:t>
+            </a:r>
+            <a:br>
+              <a:rPr lang="en-US" dirty="0" smtClean="0">
+                <a:latin typeface="Aparajita" pitchFamily="18" charset="0"/>
+                <a:cs typeface="Aparajita" pitchFamily="18" charset="0"/>
+              </a:rPr>
+            </a:br>
+            <a:r>
+              <a:rPr lang="en-US" dirty="0" smtClean="0">
+                <a:latin typeface="Aparajita" pitchFamily="18" charset="0"/>
+                <a:cs typeface="Aparajita" pitchFamily="18" charset="0"/>
+              </a:rPr>
+              <a:t>- Activity</a:t>
+            </a:r>
+            <a:br>
+              <a:rPr lang="en-US" dirty="0" smtClean="0">
+                <a:latin typeface="Aparajita" pitchFamily="18" charset="0"/>
+                <a:cs typeface="Aparajita" pitchFamily="18" charset="0"/>
+              </a:rPr>
+            </a:br>
+            <a:r>
+              <a:rPr lang="en-US" dirty="0" smtClean="0">
+                <a:latin typeface="Aparajita" pitchFamily="18" charset="0"/>
+                <a:cs typeface="Aparajita" pitchFamily="18" charset="0"/>
+              </a:rPr>
+              <a:t>- Incentives</a:t>
+            </a:r>
+            <a:endParaRPr lang="en-US" dirty="0">
+              <a:latin typeface="Aparajita" pitchFamily="18" charset="0"/>
+              <a:cs typeface="Aparajita" pitchFamily="18" charset="0"/>
+            </a:endParaRPr>
+          </a:p>
+          <a:p>
+            <a:r>
+              <a:rPr lang="en-US" dirty="0" smtClean="0">
+                <a:hlinkClick r:id="rId4" action="ppaction://hlinksldjump"/>
+              </a:rPr>
               <a:t>Applications</a:t>
             </a:r>
+            <a:r>
+              <a:rPr lang="en-US" dirty="0" smtClean="0"/>
+              <a:t/>
+            </a:r>
+            <a:br>
+              <a:rPr lang="en-US" dirty="0" smtClean="0"/>
+            </a:br>
+            <a:r>
+              <a:rPr lang="en-US" dirty="0" smtClean="0">
+                <a:latin typeface="Aparajita" pitchFamily="18" charset="0"/>
+                <a:cs typeface="Aparajita" pitchFamily="18" charset="0"/>
+              </a:rPr>
+              <a:t>- Banking</a:t>
+            </a:r>
+            <a:br>
+              <a:rPr lang="en-US" dirty="0" smtClean="0">
+                <a:latin typeface="Aparajita" pitchFamily="18" charset="0"/>
+                <a:cs typeface="Aparajita" pitchFamily="18" charset="0"/>
+              </a:rPr>
+            </a:br>
+            <a:r>
+              <a:rPr lang="en-US" dirty="0" smtClean="0">
+                <a:latin typeface="Aparajita" pitchFamily="18" charset="0"/>
+                <a:cs typeface="Aparajita" pitchFamily="18" charset="0"/>
+              </a:rPr>
+              <a:t>- Real Estate</a:t>
+            </a:r>
+            <a:br>
+              <a:rPr lang="en-US" dirty="0" smtClean="0">
+                <a:latin typeface="Aparajita" pitchFamily="18" charset="0"/>
+                <a:cs typeface="Aparajita" pitchFamily="18" charset="0"/>
+              </a:rPr>
+            </a:br>
+            <a:r>
+              <a:rPr lang="en-US" dirty="0" smtClean="0">
+                <a:latin typeface="Aparajita" pitchFamily="18" charset="0"/>
+                <a:cs typeface="Aparajita" pitchFamily="18" charset="0"/>
+              </a:rPr>
+              <a:t>- Logistics</a:t>
+            </a:r>
+            <a:br>
+              <a:rPr lang="en-US" dirty="0" smtClean="0">
+                <a:latin typeface="Aparajita" pitchFamily="18" charset="0"/>
+                <a:cs typeface="Aparajita" pitchFamily="18" charset="0"/>
+              </a:rPr>
+            </a:br>
+            <a:r>
+              <a:rPr lang="en-US" dirty="0" smtClean="0">
+                <a:latin typeface="Aparajita" pitchFamily="18" charset="0"/>
+                <a:cs typeface="Aparajita" pitchFamily="18" charset="0"/>
+              </a:rPr>
+              <a:t>- Healthcare</a:t>
+            </a:r>
+            <a:br>
+              <a:rPr lang="en-US" dirty="0" smtClean="0">
+                <a:latin typeface="Aparajita" pitchFamily="18" charset="0"/>
+                <a:cs typeface="Aparajita" pitchFamily="18" charset="0"/>
+              </a:rPr>
+            </a:br>
+            <a:r>
+              <a:rPr lang="en-US" dirty="0" smtClean="0">
+                <a:latin typeface="Aparajita" pitchFamily="18" charset="0"/>
+                <a:cs typeface="Aparajita" pitchFamily="18" charset="0"/>
+              </a:rPr>
+              <a:t>- Food delivery</a:t>
+            </a:r>
+            <a:br>
+              <a:rPr lang="en-US" dirty="0" smtClean="0">
+                <a:latin typeface="Aparajita" pitchFamily="18" charset="0"/>
+                <a:cs typeface="Aparajita" pitchFamily="18" charset="0"/>
+              </a:rPr>
+            </a:br>
+            <a:r>
+              <a:rPr lang="en-US" dirty="0" smtClean="0">
+                <a:latin typeface="Aparajita" pitchFamily="18" charset="0"/>
+                <a:cs typeface="Aparajita" pitchFamily="18" charset="0"/>
+              </a:rPr>
+              <a:t>- Cab request</a:t>
+            </a:r>
+            <a:br>
+              <a:rPr lang="en-US" dirty="0" smtClean="0">
+                <a:latin typeface="Aparajita" pitchFamily="18" charset="0"/>
+                <a:cs typeface="Aparajita" pitchFamily="18" charset="0"/>
+              </a:rPr>
+            </a:br>
+            <a:r>
+              <a:rPr lang="en-US" dirty="0" smtClean="0">
+                <a:latin typeface="Aparajita" pitchFamily="18" charset="0"/>
+                <a:cs typeface="Aparajita" pitchFamily="18" charset="0"/>
+              </a:rPr>
+              <a:t>- E-commerce</a:t>
+            </a:r>
+            <a:r>
+              <a:rPr lang="en-US" dirty="0" smtClean="0"/>
+              <a:t/>
+            </a:r>
+            <a:br>
+              <a:rPr lang="en-US" dirty="0" smtClean="0"/>
+            </a:br>
             <a:endParaRPr lang="en-US" dirty="0"/>
           </a:p>
           <a:p>
@@ -5129,7 +5416,7 @@
           <p:cNvPr id="4" name="Picture 3">
             <a:extLst>
               <a:ext uri="{FF2B5EF4-FFF2-40B4-BE49-F238E27FC236}">
-                <a16:creationId xmlns="" xmlns:a16="http://schemas.microsoft.com/office/drawing/2014/main" id="{CC39BCE5-6BEA-466E-BEFB-C39FA08D7DC7}"/>
+                <a16:creationId xmlns:a16="http://schemas.microsoft.com/office/drawing/2014/main" xmlns="" id="{CC39BCE5-6BEA-466E-BEFB-C39FA08D7DC7}"/>
               </a:ext>
             </a:extLst>
           </p:cNvPr>
@@ -5139,7 +5426,7 @@
           <p:nvPr/>
         </p:nvPicPr>
         <p:blipFill>
-          <a:blip r:embed="rId4"/>
+          <a:blip r:embed="rId5"/>
           <a:stretch>
             <a:fillRect/>
           </a:stretch>
@@ -5157,13 +5444,20 @@
     </p:spTree>
     <p:extLst>
       <p:ext uri="{BB962C8B-B14F-4D97-AF65-F5344CB8AC3E}">
-        <p14:creationId xmlns="" xmlns:p14="http://schemas.microsoft.com/office/powerpoint/2010/main" val="263784652"/>
+        <p14:creationId xmlns:p14="http://schemas.microsoft.com/office/powerpoint/2010/main" xmlns="" val="263784652"/>
       </p:ext>
     </p:extLst>
   </p:cSld>
   <p:clrMapOvr>
     <a:masterClrMapping/>
   </p:clrMapOvr>
+  <p:timing>
+    <p:tnLst>
+      <p:par>
+        <p:cTn id="1" dur="indefinite" restart="never" nodeType="tmRoot"/>
+      </p:par>
+    </p:tnLst>
+  </p:timing>
 </p:sld>
 </file>
 
@@ -5189,7 +5483,7 @@
           <p:cNvPr id="2" name="Title 1">
             <a:extLst>
               <a:ext uri="{FF2B5EF4-FFF2-40B4-BE49-F238E27FC236}">
-                <a16:creationId xmlns="" xmlns:a16="http://schemas.microsoft.com/office/drawing/2014/main" id="{DBC6775C-1BF0-434F-A429-28C52C8BEFD7}"/>
+                <a16:creationId xmlns:a16="http://schemas.microsoft.com/office/drawing/2014/main" xmlns="" id="{DBC6775C-1BF0-434F-A429-28C52C8BEFD7}"/>
               </a:ext>
             </a:extLst>
           </p:cNvPr>
@@ -5232,7 +5526,7 @@
           <p:cNvPr id="3" name="Picture 2">
             <a:extLst>
               <a:ext uri="{FF2B5EF4-FFF2-40B4-BE49-F238E27FC236}">
-                <a16:creationId xmlns="" xmlns:a16="http://schemas.microsoft.com/office/drawing/2014/main" id="{CDA99D69-C0AD-430E-8EFD-7CD800A1FCC0}"/>
+                <a16:creationId xmlns:a16="http://schemas.microsoft.com/office/drawing/2014/main" xmlns="" id="{CDA99D69-C0AD-430E-8EFD-7CD800A1FCC0}"/>
               </a:ext>
             </a:extLst>
           </p:cNvPr>
@@ -5260,13 +5554,20 @@
     </p:spTree>
     <p:extLst>
       <p:ext uri="{BB962C8B-B14F-4D97-AF65-F5344CB8AC3E}">
-        <p14:creationId xmlns="" xmlns:p14="http://schemas.microsoft.com/office/powerpoint/2010/main" val="3020031122"/>
+        <p14:creationId xmlns:p14="http://schemas.microsoft.com/office/powerpoint/2010/main" xmlns="" val="3020031122"/>
       </p:ext>
     </p:extLst>
   </p:cSld>
   <p:clrMapOvr>
     <a:masterClrMapping/>
   </p:clrMapOvr>
+  <p:timing>
+    <p:tnLst>
+      <p:par>
+        <p:cTn id="1" dur="indefinite" restart="never" nodeType="tmRoot"/>
+      </p:par>
+    </p:tnLst>
+  </p:timing>
 </p:sld>
 </file>
 
@@ -5339,7 +5640,7 @@
           <p:cNvPr id="4" name="Picture 2" descr="Image for post">
             <a:extLst>
               <a:ext uri="{FF2B5EF4-FFF2-40B4-BE49-F238E27FC236}">
-                <a16:creationId xmlns="" xmlns:a16="http://schemas.microsoft.com/office/drawing/2014/main" id="{4FC6EBF6-9E9B-4027-8418-B6DDB02DA89F}"/>
+                <a16:creationId xmlns:a16="http://schemas.microsoft.com/office/drawing/2014/main" xmlns="" id="{4FC6EBF6-9E9B-4027-8418-B6DDB02DA89F}"/>
               </a:ext>
             </a:extLst>
           </p:cNvPr>
@@ -5352,7 +5653,7 @@
           <a:blip r:embed="rId2">
             <a:extLst>
               <a:ext uri="{28A0092B-C50C-407E-A947-70E740481C1C}">
-                <a14:useLocalDpi xmlns="" xmlns:a14="http://schemas.microsoft.com/office/drawing/2010/main" val="0"/>
+                <a14:useLocalDpi xmlns:a14="http://schemas.microsoft.com/office/drawing/2010/main" xmlns="" val="0"/>
               </a:ext>
             </a:extLst>
           </a:blip>
@@ -5372,7 +5673,7 @@
           <a:noFill/>
           <a:extLst>
             <a:ext uri="{909E8E84-426E-40DD-AFC4-6F175D3DCCD1}">
-              <a14:hiddenFill xmlns="" xmlns:a14="http://schemas.microsoft.com/office/drawing/2010/main">
+              <a14:hiddenFill xmlns:a14="http://schemas.microsoft.com/office/drawing/2010/main" xmlns="">
                 <a:solidFill>
                   <a:srgbClr val="FFFFFF"/>
                 </a:solidFill>
@@ -5411,7 +5712,7 @@
           <p:cNvPr id="2" name="Title 1">
             <a:extLst>
               <a:ext uri="{FF2B5EF4-FFF2-40B4-BE49-F238E27FC236}">
-                <a16:creationId xmlns="" xmlns:a16="http://schemas.microsoft.com/office/drawing/2014/main" id="{1C618411-50A8-4BE8-AA9F-ADFDF09EFE42}"/>
+                <a16:creationId xmlns:a16="http://schemas.microsoft.com/office/drawing/2014/main" xmlns="" id="{1C618411-50A8-4BE8-AA9F-ADFDF09EFE42}"/>
               </a:ext>
             </a:extLst>
           </p:cNvPr>
@@ -5440,7 +5741,7 @@
           <p:cNvPr id="3" name="Content Placeholder 2">
             <a:extLst>
               <a:ext uri="{FF2B5EF4-FFF2-40B4-BE49-F238E27FC236}">
-                <a16:creationId xmlns="" xmlns:a16="http://schemas.microsoft.com/office/drawing/2014/main" id="{6D59F83B-DE4F-430A-9857-9FF87DC6F4FC}"/>
+                <a16:creationId xmlns:a16="http://schemas.microsoft.com/office/drawing/2014/main" xmlns="" id="{6D59F83B-DE4F-430A-9857-9FF87DC6F4FC}"/>
               </a:ext>
             </a:extLst>
           </p:cNvPr>
@@ -5525,7 +5826,7 @@
           <p:cNvPr id="5" name="AutoShape 24">
             <a:extLst>
               <a:ext uri="{FF2B5EF4-FFF2-40B4-BE49-F238E27FC236}">
-                <a16:creationId xmlns="" xmlns:a16="http://schemas.microsoft.com/office/drawing/2014/main" id="{8BA9AC28-F55F-449F-AAE5-F4900F3C2C64}"/>
+                <a16:creationId xmlns:a16="http://schemas.microsoft.com/office/drawing/2014/main" xmlns="" id="{8BA9AC28-F55F-449F-AAE5-F4900F3C2C64}"/>
               </a:ext>
             </a:extLst>
           </p:cNvPr>
@@ -5545,7 +5846,7 @@
           <a:noFill/>
           <a:extLst>
             <a:ext uri="{909E8E84-426E-40DD-AFC4-6F175D3DCCD1}">
-              <a14:hiddenFill xmlns="" xmlns:a14="http://schemas.microsoft.com/office/drawing/2010/main">
+              <a14:hiddenFill xmlns:a14="http://schemas.microsoft.com/office/drawing/2010/main" xmlns="">
                 <a:solidFill>
                   <a:srgbClr val="FFFFFF"/>
                 </a:solidFill>
@@ -5570,7 +5871,7 @@
           <p:cNvPr id="9" name="Picture 8">
             <a:extLst>
               <a:ext uri="{FF2B5EF4-FFF2-40B4-BE49-F238E27FC236}">
-                <a16:creationId xmlns="" xmlns:a16="http://schemas.microsoft.com/office/drawing/2014/main" id="{34640D63-4EB2-40A2-BCAC-583083C78C97}"/>
+                <a16:creationId xmlns:a16="http://schemas.microsoft.com/office/drawing/2014/main" xmlns="" id="{34640D63-4EB2-40A2-BCAC-583083C78C97}"/>
               </a:ext>
             </a:extLst>
           </p:cNvPr>
@@ -5600,7 +5901,7 @@
           <p:cNvPr id="8" name="Picture 7">
             <a:extLst>
               <a:ext uri="{FF2B5EF4-FFF2-40B4-BE49-F238E27FC236}">
-                <a16:creationId xmlns="" xmlns:a16="http://schemas.microsoft.com/office/drawing/2014/main" id="{2E6E5EE1-AD63-4067-A19B-83EA7E228AF4}"/>
+                <a16:creationId xmlns:a16="http://schemas.microsoft.com/office/drawing/2014/main" xmlns="" id="{2E6E5EE1-AD63-4067-A19B-83EA7E228AF4}"/>
               </a:ext>
             </a:extLst>
           </p:cNvPr>
@@ -5628,7 +5929,7 @@
     </p:spTree>
     <p:extLst>
       <p:ext uri="{BB962C8B-B14F-4D97-AF65-F5344CB8AC3E}">
-        <p14:creationId xmlns="" xmlns:p14="http://schemas.microsoft.com/office/powerpoint/2010/main" val="3659069593"/>
+        <p14:creationId xmlns:p14="http://schemas.microsoft.com/office/powerpoint/2010/main" xmlns="" val="3659069593"/>
       </p:ext>
     </p:extLst>
   </p:cSld>
@@ -5693,7 +5994,23 @@
           <a:bodyPr/>
           <a:lstStyle/>
           <a:p>
-            <a:endParaRPr lang="en-US"/>
+            <a:r>
+              <a:rPr lang="en-IN" dirty="0" smtClean="0"/>
+              <a:t>Public, </a:t>
+            </a:r>
+            <a:r>
+              <a:rPr lang="en-IN" dirty="0" err="1" smtClean="0"/>
+              <a:t>permissionless</a:t>
+            </a:r>
+            <a:r>
+              <a:rPr lang="en-IN" dirty="0" smtClean="0"/>
+              <a:t>, private, </a:t>
+            </a:r>
+            <a:r>
+              <a:rPr lang="en-IN" dirty="0" err="1" smtClean="0"/>
+              <a:t>permissioned</a:t>
+            </a:r>
+            <a:endParaRPr lang="en-US" dirty="0"/>
           </a:p>
         </p:txBody>
       </p:sp>
@@ -5727,7 +6044,7 @@
           <p:cNvPr id="2" name="Title 1">
             <a:extLst>
               <a:ext uri="{FF2B5EF4-FFF2-40B4-BE49-F238E27FC236}">
-                <a16:creationId xmlns="" xmlns:a16="http://schemas.microsoft.com/office/drawing/2014/main" id="{1C618411-50A8-4BE8-AA9F-ADFDF09EFE42}"/>
+                <a16:creationId xmlns:a16="http://schemas.microsoft.com/office/drawing/2014/main" xmlns="" id="{1C618411-50A8-4BE8-AA9F-ADFDF09EFE42}"/>
               </a:ext>
             </a:extLst>
           </p:cNvPr>
@@ -5760,7 +6077,7 @@
           <p:cNvPr id="3" name="Content Placeholder 2">
             <a:extLst>
               <a:ext uri="{FF2B5EF4-FFF2-40B4-BE49-F238E27FC236}">
-                <a16:creationId xmlns="" xmlns:a16="http://schemas.microsoft.com/office/drawing/2014/main" id="{6D59F83B-DE4F-430A-9857-9FF87DC6F4FC}"/>
+                <a16:creationId xmlns:a16="http://schemas.microsoft.com/office/drawing/2014/main" xmlns="" id="{6D59F83B-DE4F-430A-9857-9FF87DC6F4FC}"/>
               </a:ext>
             </a:extLst>
           </p:cNvPr>
@@ -5845,7 +6162,7 @@
           <p:cNvPr id="5" name="AutoShape 24">
             <a:extLst>
               <a:ext uri="{FF2B5EF4-FFF2-40B4-BE49-F238E27FC236}">
-                <a16:creationId xmlns="" xmlns:a16="http://schemas.microsoft.com/office/drawing/2014/main" id="{8BA9AC28-F55F-449F-AAE5-F4900F3C2C64}"/>
+                <a16:creationId xmlns:a16="http://schemas.microsoft.com/office/drawing/2014/main" xmlns="" id="{8BA9AC28-F55F-449F-AAE5-F4900F3C2C64}"/>
               </a:ext>
             </a:extLst>
           </p:cNvPr>
@@ -5865,7 +6182,7 @@
           <a:noFill/>
           <a:extLst>
             <a:ext uri="{909E8E84-426E-40DD-AFC4-6F175D3DCCD1}">
-              <a14:hiddenFill xmlns="" xmlns:a14="http://schemas.microsoft.com/office/drawing/2010/main">
+              <a14:hiddenFill xmlns:a14="http://schemas.microsoft.com/office/drawing/2010/main" xmlns="">
                 <a:solidFill>
                   <a:srgbClr val="FFFFFF"/>
                 </a:solidFill>
@@ -5890,7 +6207,7 @@
           <p:cNvPr id="9" name="Picture 8">
             <a:extLst>
               <a:ext uri="{FF2B5EF4-FFF2-40B4-BE49-F238E27FC236}">
-                <a16:creationId xmlns="" xmlns:a16="http://schemas.microsoft.com/office/drawing/2014/main" id="{34640D63-4EB2-40A2-BCAC-583083C78C97}"/>
+                <a16:creationId xmlns:a16="http://schemas.microsoft.com/office/drawing/2014/main" xmlns="" id="{34640D63-4EB2-40A2-BCAC-583083C78C97}"/>
               </a:ext>
             </a:extLst>
           </p:cNvPr>
@@ -5920,7 +6237,7 @@
           <p:cNvPr id="8" name="Picture 7">
             <a:extLst>
               <a:ext uri="{FF2B5EF4-FFF2-40B4-BE49-F238E27FC236}">
-                <a16:creationId xmlns="" xmlns:a16="http://schemas.microsoft.com/office/drawing/2014/main" id="{2E6E5EE1-AD63-4067-A19B-83EA7E228AF4}"/>
+                <a16:creationId xmlns:a16="http://schemas.microsoft.com/office/drawing/2014/main" xmlns="" id="{2E6E5EE1-AD63-4067-A19B-83EA7E228AF4}"/>
               </a:ext>
             </a:extLst>
           </p:cNvPr>
@@ -5948,7 +6265,7 @@
     </p:spTree>
     <p:extLst>
       <p:ext uri="{BB962C8B-B14F-4D97-AF65-F5344CB8AC3E}">
-        <p14:creationId xmlns="" xmlns:p14="http://schemas.microsoft.com/office/powerpoint/2010/main" val="3659069593"/>
+        <p14:creationId xmlns:p14="http://schemas.microsoft.com/office/powerpoint/2010/main" xmlns="" val="3659069593"/>
       </p:ext>
     </p:extLst>
   </p:cSld>
@@ -5980,7 +6297,7 @@
           <p:cNvPr id="5" name="Picture 4">
             <a:extLst>
               <a:ext uri="{FF2B5EF4-FFF2-40B4-BE49-F238E27FC236}">
-                <a16:creationId xmlns="" xmlns:a16="http://schemas.microsoft.com/office/drawing/2014/main" id="{F537BEB0-FF60-41FD-BF15-88BEB38D8587}"/>
+                <a16:creationId xmlns:a16="http://schemas.microsoft.com/office/drawing/2014/main" xmlns="" id="{F537BEB0-FF60-41FD-BF15-88BEB38D8587}"/>
               </a:ext>
             </a:extLst>
           </p:cNvPr>
@@ -6010,7 +6327,7 @@
           <p:cNvPr id="8" name="TextBox 7">
             <a:extLst>
               <a:ext uri="{FF2B5EF4-FFF2-40B4-BE49-F238E27FC236}">
-                <a16:creationId xmlns="" xmlns:a16="http://schemas.microsoft.com/office/drawing/2014/main" id="{D11D760C-71BB-413C-9EEA-DED976BA19E6}"/>
+                <a16:creationId xmlns:a16="http://schemas.microsoft.com/office/drawing/2014/main" xmlns="" id="{D11D760C-71BB-413C-9EEA-DED976BA19E6}"/>
               </a:ext>
             </a:extLst>
           </p:cNvPr>
@@ -6060,7 +6377,7 @@
           <p:cNvPr id="9" name="TextBox 8">
             <a:extLst>
               <a:ext uri="{FF2B5EF4-FFF2-40B4-BE49-F238E27FC236}">
-                <a16:creationId xmlns="" xmlns:a16="http://schemas.microsoft.com/office/drawing/2014/main" id="{CEE88A5C-BC11-487A-ADE7-3962DD93F9D2}"/>
+                <a16:creationId xmlns:a16="http://schemas.microsoft.com/office/drawing/2014/main" xmlns="" id="{CEE88A5C-BC11-487A-ADE7-3962DD93F9D2}"/>
               </a:ext>
             </a:extLst>
           </p:cNvPr>
@@ -6110,7 +6427,7 @@
           <p:cNvPr id="7" name="Picture 2">
             <a:extLst>
               <a:ext uri="{FF2B5EF4-FFF2-40B4-BE49-F238E27FC236}">
-                <a16:creationId xmlns="" xmlns:a16="http://schemas.microsoft.com/office/drawing/2014/main" id="{784EF727-FCD3-4AB6-B597-A89B3B9B97B1}"/>
+                <a16:creationId xmlns:a16="http://schemas.microsoft.com/office/drawing/2014/main" xmlns="" id="{784EF727-FCD3-4AB6-B597-A89B3B9B97B1}"/>
               </a:ext>
             </a:extLst>
           </p:cNvPr>
@@ -6123,7 +6440,7 @@
           <a:blip r:embed="rId3">
             <a:extLst>
               <a:ext uri="{28A0092B-C50C-407E-A947-70E740481C1C}">
-                <a14:useLocalDpi xmlns="" xmlns:a14="http://schemas.microsoft.com/office/drawing/2010/main" val="0"/>
+                <a14:useLocalDpi xmlns:a14="http://schemas.microsoft.com/office/drawing/2010/main" xmlns="" val="0"/>
               </a:ext>
             </a:extLst>
           </a:blip>
@@ -6143,7 +6460,7 @@
           <a:noFill/>
           <a:extLst>
             <a:ext uri="{909E8E84-426E-40DD-AFC4-6F175D3DCCD1}">
-              <a14:hiddenFill xmlns="" xmlns:a14="http://schemas.microsoft.com/office/drawing/2010/main">
+              <a14:hiddenFill xmlns:a14="http://schemas.microsoft.com/office/drawing/2010/main" xmlns="">
                 <a:solidFill>
                   <a:srgbClr val="FFFFFF"/>
                 </a:solidFill>
@@ -6157,7 +6474,7 @@
           <p:cNvPr id="1028" name="Picture 4">
             <a:extLst>
               <a:ext uri="{FF2B5EF4-FFF2-40B4-BE49-F238E27FC236}">
-                <a16:creationId xmlns="" xmlns:a16="http://schemas.microsoft.com/office/drawing/2014/main" id="{B0814AAB-9489-4878-9125-14B41C987516}"/>
+                <a16:creationId xmlns:a16="http://schemas.microsoft.com/office/drawing/2014/main" xmlns="" id="{B0814AAB-9489-4878-9125-14B41C987516}"/>
               </a:ext>
             </a:extLst>
           </p:cNvPr>
@@ -6170,7 +6487,7 @@
           <a:blip r:embed="rId4">
             <a:extLst>
               <a:ext uri="{28A0092B-C50C-407E-A947-70E740481C1C}">
-                <a14:useLocalDpi xmlns="" xmlns:a14="http://schemas.microsoft.com/office/drawing/2010/main" val="0"/>
+                <a14:useLocalDpi xmlns:a14="http://schemas.microsoft.com/office/drawing/2010/main" xmlns="" val="0"/>
               </a:ext>
             </a:extLst>
           </a:blip>
@@ -6190,7 +6507,7 @@
           <a:noFill/>
           <a:extLst>
             <a:ext uri="{909E8E84-426E-40DD-AFC4-6F175D3DCCD1}">
-              <a14:hiddenFill xmlns="" xmlns:a14="http://schemas.microsoft.com/office/drawing/2010/main">
+              <a14:hiddenFill xmlns:a14="http://schemas.microsoft.com/office/drawing/2010/main" xmlns="">
                 <a:solidFill>
                   <a:srgbClr val="FFFFFF"/>
                 </a:solidFill>
@@ -6204,7 +6521,7 @@
           <p:cNvPr id="12" name="TextBox 11">
             <a:extLst>
               <a:ext uri="{FF2B5EF4-FFF2-40B4-BE49-F238E27FC236}">
-                <a16:creationId xmlns="" xmlns:a16="http://schemas.microsoft.com/office/drawing/2014/main" id="{2AF6CFC5-4A78-48C8-8772-3813D12A9B4D}"/>
+                <a16:creationId xmlns:a16="http://schemas.microsoft.com/office/drawing/2014/main" xmlns="" id="{2AF6CFC5-4A78-48C8-8772-3813D12A9B4D}"/>
               </a:ext>
             </a:extLst>
           </p:cNvPr>
@@ -6329,7 +6646,7 @@
           <p:cNvPr id="13" name="TextBox 12">
             <a:extLst>
               <a:ext uri="{FF2B5EF4-FFF2-40B4-BE49-F238E27FC236}">
-                <a16:creationId xmlns="" xmlns:a16="http://schemas.microsoft.com/office/drawing/2014/main" id="{2C258202-B71B-4040-ABB7-6D57DFF4D825}"/>
+                <a16:creationId xmlns:a16="http://schemas.microsoft.com/office/drawing/2014/main" xmlns="" id="{2C258202-B71B-4040-ABB7-6D57DFF4D825}"/>
               </a:ext>
             </a:extLst>
           </p:cNvPr>
@@ -6440,7 +6757,7 @@
     </p:spTree>
     <p:extLst>
       <p:ext uri="{BB962C8B-B14F-4D97-AF65-F5344CB8AC3E}">
-        <p14:creationId xmlns="" xmlns:p14="http://schemas.microsoft.com/office/powerpoint/2010/main" val="1756368672"/>
+        <p14:creationId xmlns:p14="http://schemas.microsoft.com/office/powerpoint/2010/main" xmlns="" val="1756368672"/>
       </p:ext>
     </p:extLst>
   </p:cSld>
@@ -6472,7 +6789,7 @@
           <p:cNvPr id="2" name="Title 1">
             <a:extLst>
               <a:ext uri="{FF2B5EF4-FFF2-40B4-BE49-F238E27FC236}">
-                <a16:creationId xmlns="" xmlns:a16="http://schemas.microsoft.com/office/drawing/2014/main" id="{9B8A52B3-BB66-42EA-ADE2-07AE6302E721}"/>
+                <a16:creationId xmlns:a16="http://schemas.microsoft.com/office/drawing/2014/main" xmlns="" id="{9B8A52B3-BB66-42EA-ADE2-07AE6302E721}"/>
               </a:ext>
             </a:extLst>
           </p:cNvPr>
@@ -6528,7 +6845,7 @@
           <p:cNvPr id="4" name="Picture 3">
             <a:extLst>
               <a:ext uri="{FF2B5EF4-FFF2-40B4-BE49-F238E27FC236}">
-                <a16:creationId xmlns="" xmlns:a16="http://schemas.microsoft.com/office/drawing/2014/main" id="{AAA9D7D6-1B97-4854-BA9A-EFD9317ACB30}"/>
+                <a16:creationId xmlns:a16="http://schemas.microsoft.com/office/drawing/2014/main" xmlns="" id="{AAA9D7D6-1B97-4854-BA9A-EFD9317ACB30}"/>
               </a:ext>
             </a:extLst>
           </p:cNvPr>
@@ -6558,7 +6875,7 @@
           <p:cNvPr id="5" name="TextBox 4">
             <a:extLst>
               <a:ext uri="{FF2B5EF4-FFF2-40B4-BE49-F238E27FC236}">
-                <a16:creationId xmlns="" xmlns:a16="http://schemas.microsoft.com/office/drawing/2014/main" id="{902EC33E-F7C3-4CFF-8DE4-B7A96777CD52}"/>
+                <a16:creationId xmlns:a16="http://schemas.microsoft.com/office/drawing/2014/main" xmlns="" id="{902EC33E-F7C3-4CFF-8DE4-B7A96777CD52}"/>
               </a:ext>
             </a:extLst>
           </p:cNvPr>
@@ -6602,7 +6919,7 @@
           <p:cNvPr id="6" name="Picture 5">
             <a:extLst>
               <a:ext uri="{FF2B5EF4-FFF2-40B4-BE49-F238E27FC236}">
-                <a16:creationId xmlns="" xmlns:a16="http://schemas.microsoft.com/office/drawing/2014/main" id="{66939B56-B43E-4F80-9A70-BEDBC9414853}"/>
+                <a16:creationId xmlns:a16="http://schemas.microsoft.com/office/drawing/2014/main" xmlns="" id="{66939B56-B43E-4F80-9A70-BEDBC9414853}"/>
               </a:ext>
             </a:extLst>
           </p:cNvPr>
@@ -6630,7 +6947,7 @@
     </p:spTree>
     <p:extLst>
       <p:ext uri="{BB962C8B-B14F-4D97-AF65-F5344CB8AC3E}">
-        <p14:creationId xmlns="" xmlns:p14="http://schemas.microsoft.com/office/powerpoint/2010/main" val="2531434088"/>
+        <p14:creationId xmlns:p14="http://schemas.microsoft.com/office/powerpoint/2010/main" xmlns="" val="2531434088"/>
       </p:ext>
     </p:extLst>
   </p:cSld>
@@ -6903,19 +7220,19 @@
   <a:extraClrSchemeLst/>
   <a:extLst>
     <a:ext uri="{05A4C25C-085E-4340-85A3-A5531E510DB2}">
-      <thm15:themeFamily xmlns="" xmlns:thm15="http://schemas.microsoft.com/office/thememl/2012/main" name="DividendVTI" id="{97558BDE-0B66-457C-BB6F-7B1B22DAA9B8}" vid="{F53508A3-AC60-448A-AF37-934D5F1A0D5E}"/>
+      <thm15:themeFamily xmlns:thm15="http://schemas.microsoft.com/office/thememl/2012/main" xmlns="" name="DividendVTI" id="{97558BDE-0B66-457C-BB6F-7B1B22DAA9B8}" vid="{F53508A3-AC60-448A-AF37-934D5F1A0D5E}"/>
     </a:ext>
   </a:extLst>
 </a:theme>
 </file>
 
 <file path=customXml/item1.xml><?xml version="1.0" encoding="utf-8"?>
-<?mso-contentType ?>
-<FormTemplates xmlns="http://schemas.microsoft.com/sharepoint/v3/contenttype/forms">
-  <Display>DocumentLibraryForm</Display>
-  <Edit>DocumentLibraryForm</Edit>
-  <New>DocumentLibraryForm</New>
-</FormTemplates>
+<p:properties xmlns:p="http://schemas.microsoft.com/office/2006/metadata/properties" xmlns:xsi="http://www.w3.org/2001/XMLSchema-instance" xmlns:pc="http://schemas.microsoft.com/office/infopath/2007/PartnerControls">
+  <documentManagement>
+    <Status xmlns="71af3243-3dd4-4a8d-8c0d-dd76da1f02a5">Not started</Status>
+    <MediaServiceKeyPoints xmlns="71af3243-3dd4-4a8d-8c0d-dd76da1f02a5" xsi:nil="true"/>
+  </documentManagement>
+</p:properties>
 </file>
 
 <file path=customXml/item2.xml><?xml version="1.0" encoding="utf-8"?>
@@ -7140,18 +7457,20 @@
 </file>
 
 <file path=customXml/item3.xml><?xml version="1.0" encoding="utf-8"?>
-<p:properties xmlns:p="http://schemas.microsoft.com/office/2006/metadata/properties" xmlns:xsi="http://www.w3.org/2001/XMLSchema-instance" xmlns:pc="http://schemas.microsoft.com/office/infopath/2007/PartnerControls">
-  <documentManagement>
-    <Status xmlns="71af3243-3dd4-4a8d-8c0d-dd76da1f02a5">Not started</Status>
-    <MediaServiceKeyPoints xmlns="71af3243-3dd4-4a8d-8c0d-dd76da1f02a5" xsi:nil="true"/>
-  </documentManagement>
-</p:properties>
+<?mso-contentType ?>
+<FormTemplates xmlns="http://schemas.microsoft.com/sharepoint/v3/contenttype/forms">
+  <Display>DocumentLibraryForm</Display>
+  <Edit>DocumentLibraryForm</Edit>
+  <New>DocumentLibraryForm</New>
+</FormTemplates>
 </file>
 
 <file path=customXml/itemProps1.xml><?xml version="1.0" encoding="utf-8"?>
-<ds:datastoreItem xmlns:ds="http://schemas.openxmlformats.org/officeDocument/2006/customXml" ds:itemID="{927BD4C1-B6B1-4715-ABF9-E660A51A4EA0}">
+<ds:datastoreItem xmlns:ds="http://schemas.openxmlformats.org/officeDocument/2006/customXml" ds:itemID="{8D289AE2-D2AE-49D1-AFAC-3A79F6794255}">
   <ds:schemaRefs>
-    <ds:schemaRef ds:uri="http://schemas.microsoft.com/sharepoint/v3/contenttype/forms"/>
+    <ds:schemaRef ds:uri="http://schemas.microsoft.com/office/2006/metadata/properties"/>
+    <ds:schemaRef ds:uri="http://schemas.microsoft.com/office/infopath/2007/PartnerControls"/>
+    <ds:schemaRef ds:uri="71af3243-3dd4-4a8d-8c0d-dd76da1f02a5"/>
   </ds:schemaRefs>
 </ds:datastoreItem>
 </file>
@@ -7176,11 +7495,9 @@
 </file>
 
 <file path=customXml/itemProps3.xml><?xml version="1.0" encoding="utf-8"?>
-<ds:datastoreItem xmlns:ds="http://schemas.openxmlformats.org/officeDocument/2006/customXml" ds:itemID="{8D289AE2-D2AE-49D1-AFAC-3A79F6794255}">
+<ds:datastoreItem xmlns:ds="http://schemas.openxmlformats.org/officeDocument/2006/customXml" ds:itemID="{927BD4C1-B6B1-4715-ABF9-E660A51A4EA0}">
   <ds:schemaRefs>
-    <ds:schemaRef ds:uri="http://schemas.microsoft.com/office/2006/metadata/properties"/>
-    <ds:schemaRef ds:uri="http://schemas.microsoft.com/office/infopath/2007/PartnerControls"/>
-    <ds:schemaRef ds:uri="71af3243-3dd4-4a8d-8c0d-dd76da1f02a5"/>
+    <ds:schemaRef ds:uri="http://schemas.microsoft.com/sharepoint/v3/contenttype/forms"/>
   </ds:schemaRefs>
 </ds:datastoreItem>
 </file>
</xml_diff>